<commit_message>
Atualização Diagramas de Classes
</commit_message>
<xml_diff>
--- a/Primeira-Apresentação.pptx
+++ b/Primeira-Apresentação.pptx
@@ -6,8 +6,10 @@
   </p:sldMasterIdLst>
   <p:sldIdLst>
     <p:sldId id="256" r:id="rId2"/>
-    <p:sldId id="257" r:id="rId3"/>
-    <p:sldId id="258" r:id="rId4"/>
+    <p:sldId id="260" r:id="rId3"/>
+    <p:sldId id="257" r:id="rId4"/>
+    <p:sldId id="258" r:id="rId5"/>
+    <p:sldId id="259" r:id="rId6"/>
   </p:sldIdLst>
   <p:sldSz cx="12192000" cy="6858000"/>
   <p:notesSz cx="6858000" cy="9144000"/>
@@ -106,6 +108,11 @@
       </a:defRPr>
     </a:lvl9pPr>
   </p:defaultTextStyle>
+  <p:extLst>
+    <p:ext uri="{EFAFB233-063F-42B5-8137-9DF3F51BA10A}">
+      <p15:sldGuideLst xmlns:p15="http://schemas.microsoft.com/office/powerpoint/2012/main"/>
+    </p:ext>
+  </p:extLst>
 </p:presentation>
 </file>
 
@@ -294,7 +301,7 @@
           <a:p>
             <a:fld id="{62D6E202-B606-4609-B914-27C9371A1F6D}" type="datetime1">
               <a:rPr lang="en-US" smtClean="0"/>
-              <a:t>11/26/2019</a:t>
+              <a:t>11/27/2019</a:t>
             </a:fld>
             <a:endParaRPr lang="en-US" dirty="0"/>
           </a:p>
@@ -593,7 +600,7 @@
           <a:p>
             <a:fld id="{62D6E202-B606-4609-B914-27C9371A1F6D}" type="datetime1">
               <a:rPr lang="en-US" smtClean="0"/>
-              <a:t>11/26/2019</a:t>
+              <a:t>11/27/2019</a:t>
             </a:fld>
             <a:endParaRPr lang="en-US" dirty="0"/>
           </a:p>
@@ -786,7 +793,7 @@
           <a:p>
             <a:fld id="{62D6E202-B606-4609-B914-27C9371A1F6D}" type="datetime1">
               <a:rPr lang="en-US" smtClean="0"/>
-              <a:t>11/26/2019</a:t>
+              <a:t>11/27/2019</a:t>
             </a:fld>
             <a:endParaRPr lang="en-US" dirty="0"/>
           </a:p>
@@ -1048,7 +1055,7 @@
           <a:p>
             <a:fld id="{62D6E202-B606-4609-B914-27C9371A1F6D}" type="datetime1">
               <a:rPr lang="en-US" smtClean="0"/>
-              <a:t>11/26/2019</a:t>
+              <a:t>11/27/2019</a:t>
             </a:fld>
             <a:endParaRPr lang="en-US" dirty="0"/>
           </a:p>
@@ -1473,7 +1480,7 @@
           <a:p>
             <a:fld id="{62D6E202-B606-4609-B914-27C9371A1F6D}" type="datetime1">
               <a:rPr lang="en-US" smtClean="0"/>
-              <a:t>11/26/2019</a:t>
+              <a:t>11/27/2019</a:t>
             </a:fld>
             <a:endParaRPr lang="en-US" dirty="0"/>
           </a:p>
@@ -2011,7 +2018,7 @@
           <a:p>
             <a:fld id="{62D6E202-B606-4609-B914-27C9371A1F6D}" type="datetime1">
               <a:rPr lang="en-US" smtClean="0"/>
-              <a:t>11/26/2019</a:t>
+              <a:t>11/27/2019</a:t>
             </a:fld>
             <a:endParaRPr lang="en-US" dirty="0"/>
           </a:p>
@@ -2876,7 +2883,7 @@
           <a:p>
             <a:fld id="{62D6E202-B606-4609-B914-27C9371A1F6D}" type="datetime1">
               <a:rPr lang="en-US" smtClean="0"/>
-              <a:t>11/26/2019</a:t>
+              <a:t>11/27/2019</a:t>
             </a:fld>
             <a:endParaRPr lang="en-US" dirty="0"/>
           </a:p>
@@ -3047,7 +3054,7 @@
           <a:p>
             <a:fld id="{62D6E202-B606-4609-B914-27C9371A1F6D}" type="datetime1">
               <a:rPr lang="en-US" smtClean="0"/>
-              <a:t>11/26/2019</a:t>
+              <a:t>11/27/2019</a:t>
             </a:fld>
             <a:endParaRPr lang="en-US" dirty="0"/>
           </a:p>
@@ -3232,7 +3239,7 @@
           <a:p>
             <a:fld id="{62D6E202-B606-4609-B914-27C9371A1F6D}" type="datetime1">
               <a:rPr lang="en-US" smtClean="0"/>
-              <a:t>11/26/2019</a:t>
+              <a:t>11/27/2019</a:t>
             </a:fld>
             <a:endParaRPr lang="en-US" dirty="0"/>
           </a:p>
@@ -3403,7 +3410,7 @@
           <a:p>
             <a:fld id="{62D6E202-B606-4609-B914-27C9371A1F6D}" type="datetime1">
               <a:rPr lang="en-US" smtClean="0"/>
-              <a:t>11/26/2019</a:t>
+              <a:t>11/27/2019</a:t>
             </a:fld>
             <a:endParaRPr lang="en-US" dirty="0"/>
           </a:p>
@@ -3648,7 +3655,7 @@
           <a:p>
             <a:fld id="{62D6E202-B606-4609-B914-27C9371A1F6D}" type="datetime1">
               <a:rPr lang="en-US" smtClean="0"/>
-              <a:t>11/26/2019</a:t>
+              <a:t>11/27/2019</a:t>
             </a:fld>
             <a:endParaRPr lang="en-US" dirty="0"/>
           </a:p>
@@ -3885,7 +3892,7 @@
           <a:p>
             <a:fld id="{62D6E202-B606-4609-B914-27C9371A1F6D}" type="datetime1">
               <a:rPr lang="en-US" smtClean="0"/>
-              <a:t>11/26/2019</a:t>
+              <a:t>11/27/2019</a:t>
             </a:fld>
             <a:endParaRPr lang="en-US" dirty="0"/>
           </a:p>
@@ -4352,7 +4359,7 @@
           <a:p>
             <a:fld id="{62D6E202-B606-4609-B914-27C9371A1F6D}" type="datetime1">
               <a:rPr lang="en-US" smtClean="0"/>
-              <a:t>11/26/2019</a:t>
+              <a:t>11/27/2019</a:t>
             </a:fld>
             <a:endParaRPr lang="en-US" dirty="0"/>
           </a:p>
@@ -4471,7 +4478,7 @@
           <a:p>
             <a:fld id="{62D6E202-B606-4609-B914-27C9371A1F6D}" type="datetime1">
               <a:rPr lang="en-US" smtClean="0"/>
-              <a:t>11/26/2019</a:t>
+              <a:t>11/27/2019</a:t>
             </a:fld>
             <a:endParaRPr lang="en-US" dirty="0"/>
           </a:p>
@@ -4567,7 +4574,7 @@
           <a:p>
             <a:fld id="{62D6E202-B606-4609-B914-27C9371A1F6D}" type="datetime1">
               <a:rPr lang="en-US" smtClean="0"/>
-              <a:t>11/26/2019</a:t>
+              <a:t>11/27/2019</a:t>
             </a:fld>
             <a:endParaRPr lang="en-US" dirty="0"/>
           </a:p>
@@ -4823,7 +4830,7 @@
           <a:p>
             <a:fld id="{62D6E202-B606-4609-B914-27C9371A1F6D}" type="datetime1">
               <a:rPr lang="en-US" smtClean="0"/>
-              <a:t>11/26/2019</a:t>
+              <a:t>11/27/2019</a:t>
             </a:fld>
             <a:endParaRPr lang="en-US" dirty="0"/>
           </a:p>
@@ -5124,7 +5131,7 @@
           <a:p>
             <a:fld id="{62D6E202-B606-4609-B914-27C9371A1F6D}" type="datetime1">
               <a:rPr lang="en-US" smtClean="0"/>
-              <a:t>11/26/2019</a:t>
+              <a:t>11/27/2019</a:t>
             </a:fld>
             <a:endParaRPr lang="en-US" dirty="0"/>
           </a:p>
@@ -5359,7 +5366,7 @@
           <a:p>
             <a:fld id="{62D6E202-B606-4609-B914-27C9371A1F6D}" type="datetime1">
               <a:rPr lang="en-US" smtClean="0"/>
-              <a:t>11/26/2019</a:t>
+              <a:t>11/27/2019</a:t>
             </a:fld>
             <a:endParaRPr lang="en-US" dirty="0"/>
           </a:p>
@@ -6204,6 +6211,154 @@
           <p:cNvPr id="2" name="Título 1">
             <a:extLst>
               <a:ext uri="{FF2B5EF4-FFF2-40B4-BE49-F238E27FC236}">
+                <a16:creationId xmlns:a16="http://schemas.microsoft.com/office/drawing/2014/main" id="{E7C2D2B2-299E-4DC6-B47E-D83B996E11D5}"/>
+              </a:ext>
+            </a:extLst>
+          </p:cNvPr>
+          <p:cNvSpPr>
+            <a:spLocks noGrp="1"/>
+          </p:cNvSpPr>
+          <p:nvPr>
+            <p:ph type="title"/>
+          </p:nvPr>
+        </p:nvSpPr>
+        <p:spPr/>
+        <p:txBody>
+          <a:bodyPr/>
+          <a:lstStyle/>
+          <a:p>
+            <a:r>
+              <a:rPr lang="pt-PT" dirty="0"/>
+              <a:t>O que já foi feito</a:t>
+            </a:r>
+          </a:p>
+        </p:txBody>
+      </p:sp>
+      <p:sp>
+        <p:nvSpPr>
+          <p:cNvPr id="3" name="Marcador de Posição de Conteúdo 2">
+            <a:extLst>
+              <a:ext uri="{FF2B5EF4-FFF2-40B4-BE49-F238E27FC236}">
+                <a16:creationId xmlns:a16="http://schemas.microsoft.com/office/drawing/2014/main" id="{A47CB329-5850-4275-A9EE-CE4A483AA9B5}"/>
+              </a:ext>
+            </a:extLst>
+          </p:cNvPr>
+          <p:cNvSpPr>
+            <a:spLocks noGrp="1"/>
+          </p:cNvSpPr>
+          <p:nvPr>
+            <p:ph idx="1"/>
+          </p:nvPr>
+        </p:nvSpPr>
+        <p:spPr/>
+        <p:txBody>
+          <a:bodyPr>
+            <a:normAutofit/>
+          </a:bodyPr>
+          <a:lstStyle/>
+          <a:p>
+            <a:r>
+              <a:rPr lang="pt-PT" dirty="0"/>
+              <a:t>Diagramas UML</a:t>
+            </a:r>
+          </a:p>
+          <a:p>
+            <a:pPr lvl="1"/>
+            <a:r>
+              <a:rPr lang="pt-PT" dirty="0"/>
+              <a:t>Casos de Uso</a:t>
+            </a:r>
+          </a:p>
+          <a:p>
+            <a:pPr lvl="1"/>
+            <a:r>
+              <a:rPr lang="pt-PT" dirty="0"/>
+              <a:t>Diagrama de Classes</a:t>
+            </a:r>
+          </a:p>
+          <a:p>
+            <a:pPr marL="36900" indent="0">
+              <a:buNone/>
+            </a:pPr>
+            <a:endParaRPr lang="pt-PT" dirty="0"/>
+          </a:p>
+          <a:p>
+            <a:r>
+              <a:rPr lang="pt-PT" dirty="0"/>
+              <a:t>Código</a:t>
+            </a:r>
+          </a:p>
+          <a:p>
+            <a:pPr lvl="1"/>
+            <a:r>
+              <a:rPr lang="pt-PT" dirty="0"/>
+              <a:t>Modelos</a:t>
+            </a:r>
+          </a:p>
+          <a:p>
+            <a:pPr lvl="1"/>
+            <a:r>
+              <a:rPr lang="pt-PT" dirty="0"/>
+              <a:t>Repositórios</a:t>
+            </a:r>
+          </a:p>
+          <a:p>
+            <a:pPr lvl="1"/>
+            <a:r>
+              <a:rPr lang="pt-PT" dirty="0"/>
+              <a:t>Controladores</a:t>
+            </a:r>
+          </a:p>
+          <a:p>
+            <a:pPr lvl="1"/>
+            <a:r>
+              <a:rPr lang="pt-PT" dirty="0"/>
+              <a:t>Testes</a:t>
+            </a:r>
+          </a:p>
+          <a:p>
+            <a:pPr marL="36900" indent="0">
+              <a:buNone/>
+            </a:pPr>
+            <a:endParaRPr lang="pt-PT" dirty="0"/>
+          </a:p>
+        </p:txBody>
+      </p:sp>
+    </p:spTree>
+    <p:extLst>
+      <p:ext uri="{BB962C8B-B14F-4D97-AF65-F5344CB8AC3E}">
+        <p14:creationId xmlns:p14="http://schemas.microsoft.com/office/powerpoint/2010/main" val="1585364040"/>
+      </p:ext>
+    </p:extLst>
+  </p:cSld>
+  <p:clrMapOvr>
+    <a:masterClrMapping/>
+  </p:clrMapOvr>
+</p:sld>
+</file>
+
+<file path=ppt/slides/slide3.xml><?xml version="1.0" encoding="utf-8"?>
+<p:sld xmlns:a="http://schemas.openxmlformats.org/drawingml/2006/main" xmlns:r="http://schemas.openxmlformats.org/officeDocument/2006/relationships" xmlns:p="http://schemas.openxmlformats.org/presentationml/2006/main">
+  <p:cSld>
+    <p:spTree>
+      <p:nvGrpSpPr>
+        <p:cNvPr id="1" name=""/>
+        <p:cNvGrpSpPr/>
+        <p:nvPr/>
+      </p:nvGrpSpPr>
+      <p:grpSpPr>
+        <a:xfrm>
+          <a:off x="0" y="0"/>
+          <a:ext cx="0" cy="0"/>
+          <a:chOff x="0" y="0"/>
+          <a:chExt cx="0" cy="0"/>
+        </a:xfrm>
+      </p:grpSpPr>
+      <p:sp>
+        <p:nvSpPr>
+          <p:cNvPr id="2" name="Título 1">
+            <a:extLst>
+              <a:ext uri="{FF2B5EF4-FFF2-40B4-BE49-F238E27FC236}">
                 <a16:creationId xmlns:a16="http://schemas.microsoft.com/office/drawing/2014/main" id="{9AD90674-C0B1-4933-B3B5-BBD62B3A5CFD}"/>
               </a:ext>
             </a:extLst>
@@ -6277,7 +6432,7 @@
 </p:sld>
 </file>
 
-<file path=ppt/slides/slide3.xml><?xml version="1.0" encoding="utf-8"?>
+<file path=ppt/slides/slide4.xml><?xml version="1.0" encoding="utf-8"?>
 <p:sld xmlns:a="http://schemas.openxmlformats.org/drawingml/2006/main" xmlns:r="http://schemas.openxmlformats.org/officeDocument/2006/relationships" xmlns:p="http://schemas.openxmlformats.org/presentationml/2006/main">
   <p:cSld>
     <p:spTree>
@@ -6356,6 +6511,157 @@
     <p:extLst>
       <p:ext uri="{BB962C8B-B14F-4D97-AF65-F5344CB8AC3E}">
         <p14:creationId xmlns:p14="http://schemas.microsoft.com/office/powerpoint/2010/main" val="3180608931"/>
+      </p:ext>
+    </p:extLst>
+  </p:cSld>
+  <p:clrMapOvr>
+    <a:masterClrMapping/>
+  </p:clrMapOvr>
+</p:sld>
+</file>
+
+<file path=ppt/slides/slide5.xml><?xml version="1.0" encoding="utf-8"?>
+<p:sld xmlns:a="http://schemas.openxmlformats.org/drawingml/2006/main" xmlns:r="http://schemas.openxmlformats.org/officeDocument/2006/relationships" xmlns:p="http://schemas.openxmlformats.org/presentationml/2006/main">
+  <p:cSld>
+    <p:spTree>
+      <p:nvGrpSpPr>
+        <p:cNvPr id="1" name=""/>
+        <p:cNvGrpSpPr/>
+        <p:nvPr/>
+      </p:nvGrpSpPr>
+      <p:grpSpPr>
+        <a:xfrm>
+          <a:off x="0" y="0"/>
+          <a:ext cx="0" cy="0"/>
+          <a:chOff x="0" y="0"/>
+          <a:chExt cx="0" cy="0"/>
+        </a:xfrm>
+      </p:grpSpPr>
+      <p:sp>
+        <p:nvSpPr>
+          <p:cNvPr id="2" name="Título 1">
+            <a:extLst>
+              <a:ext uri="{FF2B5EF4-FFF2-40B4-BE49-F238E27FC236}">
+                <a16:creationId xmlns:a16="http://schemas.microsoft.com/office/drawing/2014/main" id="{FA08AE78-1017-4B10-9E79-CC9E44F6AC9D}"/>
+              </a:ext>
+            </a:extLst>
+          </p:cNvPr>
+          <p:cNvSpPr>
+            <a:spLocks noGrp="1"/>
+          </p:cNvSpPr>
+          <p:nvPr>
+            <p:ph type="title"/>
+          </p:nvPr>
+        </p:nvSpPr>
+        <p:spPr/>
+        <p:txBody>
+          <a:bodyPr>
+            <a:normAutofit/>
+          </a:bodyPr>
+          <a:lstStyle/>
+          <a:p>
+            <a:r>
+              <a:rPr lang="pt-PT" dirty="0"/>
+              <a:t>Problemas Encontrados e Próximas Tarefas</a:t>
+            </a:r>
+          </a:p>
+        </p:txBody>
+      </p:sp>
+      <p:sp>
+        <p:nvSpPr>
+          <p:cNvPr id="3" name="Marcador de Posição de Conteúdo 2">
+            <a:extLst>
+              <a:ext uri="{FF2B5EF4-FFF2-40B4-BE49-F238E27FC236}">
+                <a16:creationId xmlns:a16="http://schemas.microsoft.com/office/drawing/2014/main" id="{110F223F-E823-4A5A-87DA-6135442C6832}"/>
+              </a:ext>
+            </a:extLst>
+          </p:cNvPr>
+          <p:cNvSpPr>
+            <a:spLocks noGrp="1"/>
+          </p:cNvSpPr>
+          <p:nvPr>
+            <p:ph idx="1"/>
+          </p:nvPr>
+        </p:nvSpPr>
+        <p:spPr/>
+        <p:txBody>
+          <a:bodyPr/>
+          <a:lstStyle/>
+          <a:p>
+            <a:pPr marL="36900" indent="0">
+              <a:buNone/>
+            </a:pPr>
+            <a:r>
+              <a:rPr lang="pt-PT" dirty="0"/>
+              <a:t>Problemas:</a:t>
+            </a:r>
+          </a:p>
+          <a:p>
+            <a:r>
+              <a:rPr lang="pt-PT" dirty="0"/>
+              <a:t>Estruturação do Modelo Final do Projeto</a:t>
+            </a:r>
+          </a:p>
+          <a:p>
+            <a:r>
+              <a:rPr lang="pt-PT" dirty="0" err="1"/>
+              <a:t>Git</a:t>
+            </a:r>
+            <a:r>
+              <a:rPr lang="pt-PT" dirty="0"/>
+              <a:t> </a:t>
+            </a:r>
+            <a:r>
+              <a:rPr lang="pt-PT" dirty="0" err="1"/>
+              <a:t>WorkFlow</a:t>
+            </a:r>
+            <a:endParaRPr lang="pt-PT" dirty="0"/>
+          </a:p>
+          <a:p>
+            <a:endParaRPr lang="pt-PT" dirty="0"/>
+          </a:p>
+          <a:p>
+            <a:pPr marL="36900" indent="0">
+              <a:buNone/>
+            </a:pPr>
+            <a:r>
+              <a:rPr lang="pt-PT" dirty="0"/>
+              <a:t>Próximas Tarefas</a:t>
+            </a:r>
+          </a:p>
+          <a:p>
+            <a:r>
+              <a:rPr lang="pt-PT" dirty="0"/>
+              <a:t>Marcação de Atendimentos</a:t>
+            </a:r>
+          </a:p>
+          <a:p>
+            <a:r>
+              <a:rPr lang="pt-PT" dirty="0"/>
+              <a:t>Filtragem</a:t>
+            </a:r>
+          </a:p>
+          <a:p>
+            <a:r>
+              <a:rPr lang="pt-PT" dirty="0"/>
+              <a:t>Autenticação / Autorização</a:t>
+            </a:r>
+          </a:p>
+          <a:p>
+            <a:endParaRPr lang="pt-PT" dirty="0"/>
+          </a:p>
+          <a:p>
+            <a:endParaRPr lang="pt-PT" dirty="0"/>
+          </a:p>
+          <a:p>
+            <a:endParaRPr lang="pt-PT" dirty="0"/>
+          </a:p>
+        </p:txBody>
+      </p:sp>
+    </p:spTree>
+    <p:extLst>
+      <p:ext uri="{BB962C8B-B14F-4D97-AF65-F5344CB8AC3E}">
+        <p14:creationId xmlns:p14="http://schemas.microsoft.com/office/powerpoint/2010/main" val="327962614"/>
       </p:ext>
     </p:extLst>
   </p:cSld>

</xml_diff>